<commit_message>
Fixed Graphics, Added Cool Rotatable Thing In The Rotation Page.
</commit_message>
<xml_diff>
--- a/AssemblyDone/RotationP.pptx
+++ b/AssemblyDone/RotationP.pptx
@@ -3300,7 +3300,7 @@
         <p:spPr>
           <a:xfrm>
             <a:off x="5076056" y="1556792"/>
-            <a:ext cx="3384376" cy="2308324"/>
+            <a:ext cx="3384376" cy="2585323"/>
           </a:xfrm>
           <a:prstGeom prst="rect">
             <a:avLst/>
@@ -3323,7 +3323,19 @@
             <a:pPr algn="l" rtl="0"/>
             <a:r>
               <a:rPr lang="en-US" b="1" dirty="0" smtClean="0"/>
-              <a:t>Bellow is an example of an object being rotated about the point of your mouse. Enjoy this demo.</a:t>
+              <a:t>Bellow is an example of an object being rotated about </a:t>
+            </a:r>
+            <a:r>
+              <a:rPr lang="en-US" b="1" dirty="0" smtClean="0"/>
+              <a:t>its origin as you </a:t>
+            </a:r>
+            <a:r>
+              <a:rPr lang="en-US" b="1" smtClean="0"/>
+              <a:t>hold the mouse. </a:t>
+            </a:r>
+            <a:r>
+              <a:rPr lang="en-US" b="1" dirty="0" smtClean="0"/>
+              <a:t>Enjoy this demo.</a:t>
             </a:r>
             <a:endParaRPr lang="he-IL" b="1" dirty="0"/>
           </a:p>

</xml_diff>